<commit_message>
Update MIP tech architecture - v1.pptx
</commit_message>
<xml_diff>
--- a/data/figures/MIP tech architecture - v1.pptx
+++ b/data/figures/MIP tech architecture - v1.pptx
@@ -259,7 +259,7 @@
               <a:pPr>
                 <a:defRPr/>
               </a:pPr>
-              <a:t>3/5/22</a:t>
+              <a:t>3/8/22</a:t>
             </a:fld>
             <a:endParaRPr lang="en-GB"/>
           </a:p>
@@ -1082,7 +1082,7 @@
           <a:p>
             <a:fld id="{2741AD99-8C39-784E-B2CE-3100183C5BFB}" type="datetimeFigureOut">
               <a:rPr lang="en-US" smtClean="0"/>
-              <a:t>3/5/22</a:t>
+              <a:t>3/6/22</a:t>
             </a:fld>
             <a:endParaRPr lang="en-US"/>
           </a:p>
@@ -1358,7 +1358,7 @@
           <a:p>
             <a:fld id="{2741AD99-8C39-784E-B2CE-3100183C5BFB}" type="datetimeFigureOut">
               <a:rPr lang="en-US" smtClean="0"/>
-              <a:t>3/5/22</a:t>
+              <a:t>3/6/22</a:t>
             </a:fld>
             <a:endParaRPr lang="en-US"/>
           </a:p>
@@ -1550,7 +1550,7 @@
           <a:p>
             <a:fld id="{2741AD99-8C39-784E-B2CE-3100183C5BFB}" type="datetimeFigureOut">
               <a:rPr lang="en-US" smtClean="0"/>
-              <a:t>3/5/22</a:t>
+              <a:t>3/6/22</a:t>
             </a:fld>
             <a:endParaRPr lang="en-US"/>
           </a:p>
@@ -1752,7 +1752,7 @@
           <a:p>
             <a:fld id="{2741AD99-8C39-784E-B2CE-3100183C5BFB}" type="datetimeFigureOut">
               <a:rPr lang="en-US" smtClean="0"/>
-              <a:t>3/5/22</a:t>
+              <a:t>3/6/22</a:t>
             </a:fld>
             <a:endParaRPr lang="en-US"/>
           </a:p>
@@ -1974,7 +1974,7 @@
           <a:p>
             <a:fld id="{2741AD99-8C39-784E-B2CE-3100183C5BFB}" type="datetimeFigureOut">
               <a:rPr lang="en-US" smtClean="0"/>
-              <a:t>3/5/22</a:t>
+              <a:t>3/6/22</a:t>
             </a:fld>
             <a:endParaRPr lang="en-US"/>
           </a:p>
@@ -2243,7 +2243,7 @@
           <a:p>
             <a:fld id="{2741AD99-8C39-784E-B2CE-3100183C5BFB}" type="datetimeFigureOut">
               <a:rPr lang="en-US" smtClean="0"/>
-              <a:t>3/5/22</a:t>
+              <a:t>3/6/22</a:t>
             </a:fld>
             <a:endParaRPr lang="en-US"/>
           </a:p>
@@ -2552,7 +2552,7 @@
           <a:p>
             <a:fld id="{2741AD99-8C39-784E-B2CE-3100183C5BFB}" type="datetimeFigureOut">
               <a:rPr lang="en-US" smtClean="0"/>
-              <a:t>3/5/22</a:t>
+              <a:t>3/6/22</a:t>
             </a:fld>
             <a:endParaRPr lang="en-US"/>
           </a:p>
@@ -2995,7 +2995,7 @@
           <a:p>
             <a:fld id="{2741AD99-8C39-784E-B2CE-3100183C5BFB}" type="datetimeFigureOut">
               <a:rPr lang="en-US" smtClean="0"/>
-              <a:t>3/5/22</a:t>
+              <a:t>3/6/22</a:t>
             </a:fld>
             <a:endParaRPr lang="en-US"/>
           </a:p>
@@ -3136,7 +3136,7 @@
           <a:p>
             <a:fld id="{2741AD99-8C39-784E-B2CE-3100183C5BFB}" type="datetimeFigureOut">
               <a:rPr lang="en-US" smtClean="0"/>
-              <a:t>3/5/22</a:t>
+              <a:t>3/6/22</a:t>
             </a:fld>
             <a:endParaRPr lang="en-US"/>
           </a:p>
@@ -3255,7 +3255,7 @@
           <a:p>
             <a:fld id="{2741AD99-8C39-784E-B2CE-3100183C5BFB}" type="datetimeFigureOut">
               <a:rPr lang="en-US" smtClean="0"/>
-              <a:t>3/5/22</a:t>
+              <a:t>3/6/22</a:t>
             </a:fld>
             <a:endParaRPr lang="en-US"/>
           </a:p>
@@ -3554,7 +3554,7 @@
           <a:p>
             <a:fld id="{2741AD99-8C39-784E-B2CE-3100183C5BFB}" type="datetimeFigureOut">
               <a:rPr lang="en-US" smtClean="0"/>
-              <a:t>3/5/22</a:t>
+              <a:t>3/6/22</a:t>
             </a:fld>
             <a:endParaRPr lang="en-US"/>
           </a:p>
@@ -7731,7 +7731,7 @@
                 </a:solidFill>
                 <a:latin typeface="Avenir Book" panose="02000503020000020003" pitchFamily="2" charset="0"/>
               </a:rPr>
-              <a:t>Manual validation</a:t>
+              <a:t>Manual validation (REMOVE)</a:t>
             </a:r>
           </a:p>
         </p:txBody>
@@ -8154,7 +8154,7 @@
                 </a:solidFill>
                 <a:latin typeface="Avenir Book" panose="02000503020000020003" pitchFamily="2" charset="0"/>
               </a:rPr>
-              <a:t>400 museum sample (test/train)</a:t>
+              <a:t>400 museum sample (train/test)</a:t>
             </a:r>
           </a:p>
         </p:txBody>
@@ -9588,6 +9588,21 @@
 </file>
 
 <file path=customXml/item1.xml><?xml version="1.0" encoding="utf-8"?>
+<p:properties xmlns:p="http://schemas.microsoft.com/office/2006/metadata/properties" xmlns:xsi="http://www.w3.org/2001/XMLSchema-instance" xmlns:pc="http://schemas.microsoft.com/office/infopath/2007/PartnerControls">
+  <documentManagement/>
+</p:properties>
+</file>
+
+<file path=customXml/item2.xml><?xml version="1.0" encoding="utf-8"?>
+<?mso-contentType ?>
+<FormTemplates xmlns="http://schemas.microsoft.com/sharepoint/v3/contenttype/forms">
+  <Display>DocumentLibraryForm</Display>
+  <Edit>DocumentLibraryForm</Edit>
+  <New>DocumentLibraryForm</New>
+</FormTemplates>
+</file>
+
+<file path=customXml/item3.xml><?xml version="1.0" encoding="utf-8"?>
 <ct:contentTypeSchema xmlns:ct="http://schemas.microsoft.com/office/2006/metadata/contentType" xmlns:ma="http://schemas.microsoft.com/office/2006/metadata/properties/metaAttributes" ct:_="" ma:_="" ma:contentTypeName="Document" ma:contentTypeID="0x0101002C2CD1DD118472458A0E6161F2144773" ma:contentTypeVersion="13" ma:contentTypeDescription="Create a new document." ma:contentTypeScope="" ma:versionID="901835ec234860ac7f67cc898a541fcb">
   <xsd:schema xmlns:xsd="http://www.w3.org/2001/XMLSchema" xmlns:xs="http://www.w3.org/2001/XMLSchema" xmlns:p="http://schemas.microsoft.com/office/2006/metadata/properties" xmlns:ns2="0afe7543-80e5-4676-a63d-5a4feeb00470" xmlns:ns3="0accda53-abec-4882-afe9-cc0ba02332f1" targetNamespace="http://schemas.microsoft.com/office/2006/metadata/properties" ma:root="true" ma:fieldsID="d52977c14833298dd83ceb1684b285fa" ns2:_="" ns3:_="">
     <xsd:import namespace="0afe7543-80e5-4676-a63d-5a4feeb00470"/>
@@ -9810,22 +9825,32 @@
 </ct:contentTypeSchema>
 </file>
 
-<file path=customXml/item2.xml><?xml version="1.0" encoding="utf-8"?>
-<?mso-contentType ?>
-<FormTemplates xmlns="http://schemas.microsoft.com/sharepoint/v3/contenttype/forms">
-  <Display>DocumentLibraryForm</Display>
-  <Edit>DocumentLibraryForm</Edit>
-  <New>DocumentLibraryForm</New>
-</FormTemplates>
+<file path=customXml/itemProps1.xml><?xml version="1.0" encoding="utf-8"?>
+<ds:datastoreItem xmlns:ds="http://schemas.openxmlformats.org/officeDocument/2006/customXml" ds:itemID="{6F3545C3-5F61-491F-8C0B-E8C547C38C8F}">
+  <ds:schemaRefs>
+    <ds:schemaRef ds:uri="0accda53-abec-4882-afe9-cc0ba02332f1"/>
+    <ds:schemaRef ds:uri="http://schemas.microsoft.com/office/2006/documentManagement/types"/>
+    <ds:schemaRef ds:uri="http://schemas.openxmlformats.org/package/2006/metadata/core-properties"/>
+    <ds:schemaRef ds:uri="http://purl.org/dc/elements/1.1/"/>
+    <ds:schemaRef ds:uri="http://purl.org/dc/dcmitype/"/>
+    <ds:schemaRef ds:uri="http://schemas.microsoft.com/office/infopath/2007/PartnerControls"/>
+    <ds:schemaRef ds:uri="http://schemas.microsoft.com/office/2006/metadata/properties"/>
+    <ds:schemaRef ds:uri="http://purl.org/dc/terms/"/>
+    <ds:schemaRef ds:uri="0afe7543-80e5-4676-a63d-5a4feeb00470"/>
+    <ds:schemaRef ds:uri="http://www.w3.org/XML/1998/namespace"/>
+  </ds:schemaRefs>
+</ds:datastoreItem>
 </file>
 
-<file path=customXml/item3.xml><?xml version="1.0" encoding="utf-8"?>
-<p:properties xmlns:p="http://schemas.microsoft.com/office/2006/metadata/properties" xmlns:xsi="http://www.w3.org/2001/XMLSchema-instance" xmlns:pc="http://schemas.microsoft.com/office/infopath/2007/PartnerControls">
-  <documentManagement/>
-</p:properties>
+<file path=customXml/itemProps2.xml><?xml version="1.0" encoding="utf-8"?>
+<ds:datastoreItem xmlns:ds="http://schemas.openxmlformats.org/officeDocument/2006/customXml" ds:itemID="{6819633A-8796-487C-883D-63E82B42CF72}">
+  <ds:schemaRefs>
+    <ds:schemaRef ds:uri="http://schemas.microsoft.com/sharepoint/v3/contenttype/forms"/>
+  </ds:schemaRefs>
+</ds:datastoreItem>
 </file>
 
-<file path=customXml/itemProps1.xml><?xml version="1.0" encoding="utf-8"?>
+<file path=customXml/itemProps3.xml><?xml version="1.0" encoding="utf-8"?>
 <ds:datastoreItem xmlns:ds="http://schemas.openxmlformats.org/officeDocument/2006/customXml" ds:itemID="{303F79D2-090E-4F7A-98FA-DD49FB2CE2B7}">
   <ds:schemaRefs>
     <ds:schemaRef ds:uri="http://schemas.microsoft.com/office/2006/metadata/contentType"/>
@@ -9842,29 +9867,4 @@
     <ds:schemaRef ds:uri="http://schemas.microsoft.com/internal/obd"/>
   </ds:schemaRefs>
 </ds:datastoreItem>
-</file>
-
-<file path=customXml/itemProps2.xml><?xml version="1.0" encoding="utf-8"?>
-<ds:datastoreItem xmlns:ds="http://schemas.openxmlformats.org/officeDocument/2006/customXml" ds:itemID="{6819633A-8796-487C-883D-63E82B42CF72}">
-  <ds:schemaRefs>
-    <ds:schemaRef ds:uri="http://schemas.microsoft.com/sharepoint/v3/contenttype/forms"/>
-  </ds:schemaRefs>
-</ds:datastoreItem>
-</file>
-
-<file path=customXml/itemProps3.xml><?xml version="1.0" encoding="utf-8"?>
-<ds:datastoreItem xmlns:ds="http://schemas.openxmlformats.org/officeDocument/2006/customXml" ds:itemID="{6F3545C3-5F61-491F-8C0B-E8C547C38C8F}">
-  <ds:schemaRefs>
-    <ds:schemaRef ds:uri="0accda53-abec-4882-afe9-cc0ba02332f1"/>
-    <ds:schemaRef ds:uri="http://schemas.microsoft.com/office/2006/documentManagement/types"/>
-    <ds:schemaRef ds:uri="http://schemas.openxmlformats.org/package/2006/metadata/core-properties"/>
-    <ds:schemaRef ds:uri="http://purl.org/dc/elements/1.1/"/>
-    <ds:schemaRef ds:uri="http://purl.org/dc/dcmitype/"/>
-    <ds:schemaRef ds:uri="http://schemas.microsoft.com/office/infopath/2007/PartnerControls"/>
-    <ds:schemaRef ds:uri="http://schemas.microsoft.com/office/2006/metadata/properties"/>
-    <ds:schemaRef ds:uri="http://purl.org/dc/terms/"/>
-    <ds:schemaRef ds:uri="0afe7543-80e5-4676-a63d-5a4feeb00470"/>
-    <ds:schemaRef ds:uri="http://www.w3.org/XML/1998/namespace"/>
-  </ds:schemaRefs>
-</ds:datastoreItem>
 </file>
</xml_diff>